<commit_message>
updates files, adds privacy policy
</commit_message>
<xml_diff>
--- a/presentations/WearOS.pptx
+++ b/presentations/WearOS.pptx
@@ -9,8 +9,8 @@
   </p:notesMasterIdLst>
   <p:sldIdLst>
     <p:sldId id="256" r:id="rId2"/>
-    <p:sldId id="266" r:id="rId3"/>
-    <p:sldId id="260" r:id="rId4"/>
+    <p:sldId id="260" r:id="rId3"/>
+    <p:sldId id="266" r:id="rId4"/>
     <p:sldId id="267" r:id="rId5"/>
     <p:sldId id="263" r:id="rId6"/>
     <p:sldId id="262" r:id="rId7"/>
@@ -533,6 +533,31 @@
               </a:rPr>
               <a:t>the study of the measurement of time.</a:t>
             </a:r>
+          </a:p>
+          <a:p>
+            <a:endParaRPr lang="en-GB" sz="1200" b="0" i="0" kern="1200" dirty="0">
+              <a:solidFill>
+                <a:schemeClr val="tx1"/>
+              </a:solidFill>
+              <a:effectLst/>
+              <a:latin typeface="+mn-lt"/>
+              <a:ea typeface="+mn-ea"/>
+              <a:cs typeface="+mn-cs"/>
+            </a:endParaRPr>
+          </a:p>
+          <a:p>
+            <a:r>
+              <a:rPr lang="en-GB" sz="1200" b="0" i="0" kern="1200" dirty="0">
+                <a:solidFill>
+                  <a:schemeClr val="tx1"/>
+                </a:solidFill>
+                <a:effectLst/>
+                <a:latin typeface="+mn-lt"/>
+                <a:ea typeface="+mn-ea"/>
+                <a:cs typeface="+mn-cs"/>
+              </a:rPr>
+              <a:t>The goal of this talk is to inspire Android developers to start writing Wear OS apps, and dive into the platform.</a:t>
+            </a:r>
             <a:endParaRPr lang="en-US" dirty="0"/>
           </a:p>
         </p:txBody>
@@ -617,95 +642,6 @@
           <a:bodyPr/>
           <a:lstStyle/>
           <a:p>
-            <a:r>
-              <a:rPr lang="en-US" dirty="0"/>
-              <a:t>Google needs developer feedback, which we do by getting involved</a:t>
-            </a:r>
-          </a:p>
-          <a:p>
-            <a:endParaRPr lang="en-US" dirty="0"/>
-          </a:p>
-          <a:p>
-            <a:endParaRPr lang="en-US" dirty="0"/>
-          </a:p>
-          <a:p>
-            <a:r>
-              <a:rPr lang="en-US" dirty="0"/>
-              <a:t>The concerns are still the same: </a:t>
-            </a:r>
-          </a:p>
-          <a:p>
-            <a:r>
-              <a:rPr lang="en-US" dirty="0"/>
-              <a:t>Battery:</a:t>
-            </a:r>
-          </a:p>
-          <a:p>
-            <a:pPr marL="171450" indent="-171450">
-              <a:buFont typeface="Arial" panose="020B0604020202020204" pitchFamily="34" charset="0"/>
-              <a:buChar char="•"/>
-            </a:pPr>
-            <a:r>
-              <a:rPr lang="en-US" dirty="0"/>
-              <a:t>Doze in Android M – a) phone not plugged in, b) screen is off, c) phone not moving (disabled in N) – not always so easy in wearables</a:t>
-            </a:r>
-          </a:p>
-          <a:p>
-            <a:pPr marL="171450" indent="-171450">
-              <a:buFont typeface="Arial" panose="020B0604020202020204" pitchFamily="34" charset="0"/>
-              <a:buChar char="•"/>
-            </a:pPr>
-            <a:r>
-              <a:rPr lang="en-US" dirty="0"/>
-              <a:t>Standby</a:t>
-            </a:r>
-          </a:p>
-          <a:p>
-            <a:r>
-              <a:rPr lang="en-US" dirty="0"/>
-              <a:t>Privacy: </a:t>
-            </a:r>
-          </a:p>
-          <a:p>
-            <a:pPr marL="171450" indent="-171450">
-              <a:buFont typeface="Arial" panose="020B0604020202020204" pitchFamily="34" charset="0"/>
-              <a:buChar char="•"/>
-            </a:pPr>
-            <a:r>
-              <a:rPr lang="en-US" dirty="0"/>
-              <a:t>Ask for permission</a:t>
-            </a:r>
-          </a:p>
-          <a:p>
-            <a:pPr marL="171450" indent="-171450">
-              <a:buFont typeface="Arial" panose="020B0604020202020204" pitchFamily="34" charset="0"/>
-              <a:buChar char="•"/>
-            </a:pPr>
-            <a:r>
-              <a:rPr lang="en-US" dirty="0"/>
-              <a:t>Explain yourself</a:t>
-            </a:r>
-          </a:p>
-          <a:p>
-            <a:pPr marL="171450" indent="-171450">
-              <a:buFont typeface="Arial" panose="020B0604020202020204" pitchFamily="34" charset="0"/>
-              <a:buChar char="•"/>
-            </a:pPr>
-            <a:r>
-              <a:rPr lang="en-US" dirty="0"/>
-              <a:t>Worsened by fitness</a:t>
-            </a:r>
-          </a:p>
-          <a:p>
-            <a:r>
-              <a:rPr lang="en-US" dirty="0"/>
-              <a:t>Usability</a:t>
-            </a:r>
-          </a:p>
-          <a:p>
-            <a:endParaRPr lang="en-US" dirty="0"/>
-          </a:p>
-          <a:p>
             <a:endParaRPr lang="en-US" dirty="0"/>
           </a:p>
         </p:txBody>
@@ -736,7 +672,7 @@
     </p:spTree>
     <p:extLst>
       <p:ext uri="{BB962C8B-B14F-4D97-AF65-F5344CB8AC3E}">
-        <p14:creationId xmlns:p14="http://schemas.microsoft.com/office/powerpoint/2010/main" val="1792213485"/>
+        <p14:creationId xmlns:p14="http://schemas.microsoft.com/office/powerpoint/2010/main" val="3195515940"/>
       </p:ext>
     </p:extLst>
   </p:cSld>
@@ -790,6 +726,95 @@
           <a:bodyPr/>
           <a:lstStyle/>
           <a:p>
+            <a:r>
+              <a:rPr lang="en-US" dirty="0"/>
+              <a:t>Google needs developer feedback, which we do by getting involved</a:t>
+            </a:r>
+          </a:p>
+          <a:p>
+            <a:endParaRPr lang="en-US" dirty="0"/>
+          </a:p>
+          <a:p>
+            <a:endParaRPr lang="en-US" dirty="0"/>
+          </a:p>
+          <a:p>
+            <a:r>
+              <a:rPr lang="en-US" dirty="0"/>
+              <a:t>The concerns are still the same: </a:t>
+            </a:r>
+          </a:p>
+          <a:p>
+            <a:r>
+              <a:rPr lang="en-US" dirty="0"/>
+              <a:t>Battery:</a:t>
+            </a:r>
+          </a:p>
+          <a:p>
+            <a:pPr marL="171450" indent="-171450">
+              <a:buFont typeface="Arial" panose="020B0604020202020204" pitchFamily="34" charset="0"/>
+              <a:buChar char="•"/>
+            </a:pPr>
+            <a:r>
+              <a:rPr lang="en-US" dirty="0"/>
+              <a:t>Doze in Android M – a) phone not plugged in, b) screen is off, c) phone not moving (disabled in N) – not always so easy in wearables</a:t>
+            </a:r>
+          </a:p>
+          <a:p>
+            <a:pPr marL="171450" indent="-171450">
+              <a:buFont typeface="Arial" panose="020B0604020202020204" pitchFamily="34" charset="0"/>
+              <a:buChar char="•"/>
+            </a:pPr>
+            <a:r>
+              <a:rPr lang="en-US" dirty="0"/>
+              <a:t>Standby</a:t>
+            </a:r>
+          </a:p>
+          <a:p>
+            <a:r>
+              <a:rPr lang="en-US" dirty="0"/>
+              <a:t>Privacy: </a:t>
+            </a:r>
+          </a:p>
+          <a:p>
+            <a:pPr marL="171450" indent="-171450">
+              <a:buFont typeface="Arial" panose="020B0604020202020204" pitchFamily="34" charset="0"/>
+              <a:buChar char="•"/>
+            </a:pPr>
+            <a:r>
+              <a:rPr lang="en-US" dirty="0"/>
+              <a:t>Ask for permission</a:t>
+            </a:r>
+          </a:p>
+          <a:p>
+            <a:pPr marL="171450" indent="-171450">
+              <a:buFont typeface="Arial" panose="020B0604020202020204" pitchFamily="34" charset="0"/>
+              <a:buChar char="•"/>
+            </a:pPr>
+            <a:r>
+              <a:rPr lang="en-US" dirty="0"/>
+              <a:t>Explain yourself</a:t>
+            </a:r>
+          </a:p>
+          <a:p>
+            <a:pPr marL="171450" indent="-171450">
+              <a:buFont typeface="Arial" panose="020B0604020202020204" pitchFamily="34" charset="0"/>
+              <a:buChar char="•"/>
+            </a:pPr>
+            <a:r>
+              <a:rPr lang="en-US" dirty="0"/>
+              <a:t>Worsened by fitness</a:t>
+            </a:r>
+          </a:p>
+          <a:p>
+            <a:r>
+              <a:rPr lang="en-US" dirty="0"/>
+              <a:t>Usability</a:t>
+            </a:r>
+          </a:p>
+          <a:p>
+            <a:endParaRPr lang="en-US" dirty="0"/>
+          </a:p>
+          <a:p>
             <a:endParaRPr lang="en-US" dirty="0"/>
           </a:p>
         </p:txBody>
@@ -820,7 +845,7 @@
     </p:spTree>
     <p:extLst>
       <p:ext uri="{BB962C8B-B14F-4D97-AF65-F5344CB8AC3E}">
-        <p14:creationId xmlns:p14="http://schemas.microsoft.com/office/powerpoint/2010/main" val="3195515940"/>
+        <p14:creationId xmlns:p14="http://schemas.microsoft.com/office/powerpoint/2010/main" val="1792213485"/>
       </p:ext>
     </p:extLst>
   </p:cSld>
@@ -5843,6 +5868,594 @@
       </p:grpSpPr>
       <p:sp useBgFill="1">
         <p:nvSpPr>
+          <p:cNvPr id="17" name="Rectangle 16">
+            <a:extLst>
+              <a:ext uri="{FF2B5EF4-FFF2-40B4-BE49-F238E27FC236}">
+                <a16:creationId xmlns:a16="http://schemas.microsoft.com/office/drawing/2014/main" id="{1BB867FF-FC45-48F7-8104-F89BE54909F1}"/>
+              </a:ext>
+              <a:ext uri="{C183D7F6-B498-43B3-948B-1728B52AA6E4}">
+                <adec:decorative xmlns:adec="http://schemas.microsoft.com/office/drawing/2017/decorative" val="1"/>
+              </a:ext>
+            </a:extLst>
+          </p:cNvPr>
+          <p:cNvSpPr>
+            <a:spLocks noGrp="1" noRot="1" noChangeAspect="1" noMove="1" noResize="1" noEditPoints="1" noAdjustHandles="1" noChangeArrowheads="1" noChangeShapeType="1" noTextEdit="1"/>
+          </p:cNvSpPr>
+          <p:nvPr>
+            <p:extLst>
+              <p:ext uri="{386F3935-93C4-4BCD-93E2-E3B085C9AB24}">
+                <p16:designElem xmlns:p16="http://schemas.microsoft.com/office/powerpoint/2015/main" val="1"/>
+              </p:ext>
+            </p:extLst>
+          </p:nvPr>
+        </p:nvSpPr>
+        <p:spPr>
+          <a:xfrm>
+            <a:off x="3048" y="0"/>
+            <a:ext cx="12188952" cy="6858000"/>
+          </a:xfrm>
+          <a:prstGeom prst="rect">
+            <a:avLst/>
+          </a:prstGeom>
+          <a:ln>
+            <a:noFill/>
+          </a:ln>
+        </p:spPr>
+        <p:style>
+          <a:lnRef idx="2">
+            <a:schemeClr val="accent1">
+              <a:shade val="50000"/>
+            </a:schemeClr>
+          </a:lnRef>
+          <a:fillRef idx="1">
+            <a:schemeClr val="accent1"/>
+          </a:fillRef>
+          <a:effectRef idx="0">
+            <a:schemeClr val="accent1"/>
+          </a:effectRef>
+          <a:fontRef idx="minor">
+            <a:schemeClr val="lt1"/>
+          </a:fontRef>
+        </p:style>
+        <p:txBody>
+          <a:bodyPr rtlCol="0" anchor="ctr"/>
+          <a:lstStyle/>
+          <a:p>
+            <a:pPr algn="ctr"/>
+            <a:endParaRPr lang="en-US"/>
+          </a:p>
+        </p:txBody>
+      </p:sp>
+      <p:sp>
+        <p:nvSpPr>
+          <p:cNvPr id="19" name="Freeform: Shape 18">
+            <a:extLst>
+              <a:ext uri="{FF2B5EF4-FFF2-40B4-BE49-F238E27FC236}">
+                <a16:creationId xmlns:a16="http://schemas.microsoft.com/office/drawing/2014/main" id="{8BB56887-D0D5-4F0C-9E19-7247EB83C8B7}"/>
+              </a:ext>
+              <a:ext uri="{C183D7F6-B498-43B3-948B-1728B52AA6E4}">
+                <adec:decorative xmlns:adec="http://schemas.microsoft.com/office/drawing/2017/decorative" val="1"/>
+              </a:ext>
+            </a:extLst>
+          </p:cNvPr>
+          <p:cNvSpPr>
+            <a:spLocks noGrp="1" noRot="1" noChangeAspect="1" noMove="1" noResize="1" noEditPoints="1" noAdjustHandles="1" noChangeArrowheads="1" noChangeShapeType="1" noTextEdit="1"/>
+          </p:cNvSpPr>
+          <p:nvPr>
+            <p:extLst>
+              <p:ext uri="{386F3935-93C4-4BCD-93E2-E3B085C9AB24}">
+                <p16:designElem xmlns:p16="http://schemas.microsoft.com/office/powerpoint/2015/main" val="1"/>
+              </p:ext>
+            </p:extLst>
+          </p:nvPr>
+        </p:nvSpPr>
+        <p:spPr>
+          <a:xfrm>
+            <a:off x="10208695" y="1"/>
+            <a:ext cx="1135066" cy="477997"/>
+          </a:xfrm>
+          <a:custGeom>
+            <a:avLst/>
+            <a:gdLst>
+              <a:gd name="connsiteX0" fmla="*/ 0 w 1135066"/>
+              <a:gd name="connsiteY0" fmla="*/ 0 h 477997"/>
+              <a:gd name="connsiteX1" fmla="*/ 1135066 w 1135066"/>
+              <a:gd name="connsiteY1" fmla="*/ 0 h 477997"/>
+              <a:gd name="connsiteX2" fmla="*/ 1133370 w 1135066"/>
+              <a:gd name="connsiteY2" fmla="*/ 16827 h 477997"/>
+              <a:gd name="connsiteX3" fmla="*/ 567533 w 1135066"/>
+              <a:gd name="connsiteY3" fmla="*/ 477997 h 477997"/>
+              <a:gd name="connsiteX4" fmla="*/ 1696 w 1135066"/>
+              <a:gd name="connsiteY4" fmla="*/ 16827 h 477997"/>
+            </a:gdLst>
+            <a:ahLst/>
+            <a:cxnLst>
+              <a:cxn ang="0">
+                <a:pos x="connsiteX0" y="connsiteY0"/>
+              </a:cxn>
+              <a:cxn ang="0">
+                <a:pos x="connsiteX1" y="connsiteY1"/>
+              </a:cxn>
+              <a:cxn ang="0">
+                <a:pos x="connsiteX2" y="connsiteY2"/>
+              </a:cxn>
+              <a:cxn ang="0">
+                <a:pos x="connsiteX3" y="connsiteY3"/>
+              </a:cxn>
+              <a:cxn ang="0">
+                <a:pos x="connsiteX4" y="connsiteY4"/>
+              </a:cxn>
+            </a:cxnLst>
+            <a:rect l="l" t="t" r="r" b="b"/>
+            <a:pathLst>
+              <a:path w="1135066" h="477997">
+                <a:moveTo>
+                  <a:pt x="0" y="0"/>
+                </a:moveTo>
+                <a:lnTo>
+                  <a:pt x="1135066" y="0"/>
+                </a:lnTo>
+                <a:lnTo>
+                  <a:pt x="1133370" y="16827"/>
+                </a:lnTo>
+                <a:cubicBezTo>
+                  <a:pt x="1079514" y="280016"/>
+                  <a:pt x="846644" y="477997"/>
+                  <a:pt x="567533" y="477997"/>
+                </a:cubicBezTo>
+                <a:cubicBezTo>
+                  <a:pt x="288422" y="477997"/>
+                  <a:pt x="55552" y="280016"/>
+                  <a:pt x="1696" y="16827"/>
+                </a:cubicBezTo>
+                <a:close/>
+              </a:path>
+            </a:pathLst>
+          </a:custGeom>
+          <a:solidFill>
+            <a:schemeClr val="accent4"/>
+          </a:solidFill>
+          <a:ln>
+            <a:noFill/>
+          </a:ln>
+        </p:spPr>
+        <p:style>
+          <a:lnRef idx="2">
+            <a:schemeClr val="accent1">
+              <a:shade val="50000"/>
+            </a:schemeClr>
+          </a:lnRef>
+          <a:fillRef idx="1">
+            <a:schemeClr val="accent1"/>
+          </a:fillRef>
+          <a:effectRef idx="0">
+            <a:schemeClr val="accent1"/>
+          </a:effectRef>
+          <a:fontRef idx="minor">
+            <a:schemeClr val="lt1"/>
+          </a:fontRef>
+        </p:style>
+        <p:txBody>
+          <a:bodyPr wrap="square" rtlCol="0" anchor="ctr">
+            <a:noAutofit/>
+          </a:bodyPr>
+          <a:lstStyle/>
+          <a:p>
+            <a:pPr algn="ctr"/>
+            <a:endParaRPr lang="en-US"/>
+          </a:p>
+        </p:txBody>
+      </p:sp>
+      <p:sp>
+        <p:nvSpPr>
+          <p:cNvPr id="2" name="Title 1">
+            <a:extLst>
+              <a:ext uri="{FF2B5EF4-FFF2-40B4-BE49-F238E27FC236}">
+                <a16:creationId xmlns:a16="http://schemas.microsoft.com/office/drawing/2014/main" id="{9BD83972-5B67-0F43-8D1A-E3D96906CCDF}"/>
+              </a:ext>
+            </a:extLst>
+          </p:cNvPr>
+          <p:cNvSpPr>
+            <a:spLocks noGrp="1"/>
+          </p:cNvSpPr>
+          <p:nvPr>
+            <p:ph type="title"/>
+          </p:nvPr>
+        </p:nvSpPr>
+        <p:spPr>
+          <a:xfrm>
+            <a:off x="838200" y="365125"/>
+            <a:ext cx="10515600" cy="1325563"/>
+          </a:xfrm>
+        </p:spPr>
+        <p:txBody>
+          <a:bodyPr>
+            <a:normAutofit/>
+          </a:bodyPr>
+          <a:lstStyle/>
+          <a:p>
+            <a:r>
+              <a:rPr lang="en-US"/>
+              <a:t>WearOS Partners</a:t>
+            </a:r>
+            <a:endParaRPr lang="en-US" dirty="0"/>
+          </a:p>
+        </p:txBody>
+      </p:sp>
+      <p:sp>
+        <p:nvSpPr>
+          <p:cNvPr id="21" name="Arc 20">
+            <a:extLst>
+              <a:ext uri="{FF2B5EF4-FFF2-40B4-BE49-F238E27FC236}">
+                <a16:creationId xmlns:a16="http://schemas.microsoft.com/office/drawing/2014/main" id="{081E4A58-353D-44AE-B2FC-2A74E2E400F7}"/>
+              </a:ext>
+              <a:ext uri="{C183D7F6-B498-43B3-948B-1728B52AA6E4}">
+                <adec:decorative xmlns:adec="http://schemas.microsoft.com/office/drawing/2017/decorative" val="1"/>
+              </a:ext>
+            </a:extLst>
+          </p:cNvPr>
+          <p:cNvSpPr>
+            <a:spLocks noGrp="1" noRot="1" noChangeAspect="1" noMove="1" noResize="1" noEditPoints="1" noAdjustHandles="1" noChangeArrowheads="1" noChangeShapeType="1" noTextEdit="1"/>
+          </p:cNvSpPr>
+          <p:nvPr>
+            <p:extLst>
+              <p:ext uri="{386F3935-93C4-4BCD-93E2-E3B085C9AB24}">
+                <p16:designElem xmlns:p16="http://schemas.microsoft.com/office/powerpoint/2015/main" val="1"/>
+              </p:ext>
+            </p:extLst>
+          </p:nvPr>
+        </p:nvSpPr>
+        <p:spPr>
+          <a:xfrm rot="5400000" flipV="1">
+            <a:off x="555710" y="2183223"/>
+            <a:ext cx="4083433" cy="4083433"/>
+          </a:xfrm>
+          <a:prstGeom prst="arc">
+            <a:avLst/>
+          </a:prstGeom>
+          <a:ln w="127000" cap="rnd">
+            <a:solidFill>
+              <a:schemeClr val="accent4"/>
+            </a:solidFill>
+            <a:prstDash val="dash"/>
+          </a:ln>
+        </p:spPr>
+        <p:style>
+          <a:lnRef idx="1">
+            <a:schemeClr val="accent1"/>
+          </a:lnRef>
+          <a:fillRef idx="0">
+            <a:schemeClr val="accent1"/>
+          </a:fillRef>
+          <a:effectRef idx="0">
+            <a:schemeClr val="accent1"/>
+          </a:effectRef>
+          <a:fontRef idx="minor">
+            <a:schemeClr val="tx1"/>
+          </a:fontRef>
+        </p:style>
+        <p:txBody>
+          <a:bodyPr rtlCol="0" anchor="ctr"/>
+          <a:lstStyle/>
+          <a:p>
+            <a:pPr algn="ctr"/>
+            <a:endParaRPr lang="en-US" dirty="0"/>
+          </a:p>
+        </p:txBody>
+      </p:sp>
+      <p:sp>
+        <p:nvSpPr>
+          <p:cNvPr id="3" name="Content Placeholder 2">
+            <a:extLst>
+              <a:ext uri="{FF2B5EF4-FFF2-40B4-BE49-F238E27FC236}">
+                <a16:creationId xmlns:a16="http://schemas.microsoft.com/office/drawing/2014/main" id="{61828AC4-2326-7546-9EF4-3DC409E0CBC8}"/>
+              </a:ext>
+            </a:extLst>
+          </p:cNvPr>
+          <p:cNvSpPr>
+            <a:spLocks noGrp="1"/>
+          </p:cNvSpPr>
+          <p:nvPr>
+            <p:ph idx="1"/>
+          </p:nvPr>
+        </p:nvSpPr>
+        <p:spPr>
+          <a:xfrm>
+            <a:off x="838200" y="1825625"/>
+            <a:ext cx="10515600" cy="4351338"/>
+          </a:xfrm>
+        </p:spPr>
+        <p:txBody>
+          <a:bodyPr numCol="4">
+            <a:normAutofit/>
+          </a:bodyPr>
+          <a:lstStyle/>
+          <a:p>
+            <a:r>
+              <a:rPr lang="en-US" sz="2600"/>
+              <a:t>ARM</a:t>
+            </a:r>
+          </a:p>
+          <a:p>
+            <a:r>
+              <a:rPr lang="en-US" sz="2600"/>
+              <a:t>Asus</a:t>
+            </a:r>
+          </a:p>
+          <a:p>
+            <a:r>
+              <a:rPr lang="en-US" sz="2600"/>
+              <a:t>Hugo Boss</a:t>
+            </a:r>
+          </a:p>
+          <a:p>
+            <a:r>
+              <a:rPr lang="en-US" sz="2600"/>
+              <a:t>Broadcom</a:t>
+            </a:r>
+          </a:p>
+          <a:p>
+            <a:r>
+              <a:rPr lang="en-US" sz="2600"/>
+              <a:t>Casio</a:t>
+            </a:r>
+          </a:p>
+          <a:p>
+            <a:r>
+              <a:rPr lang="en-US" sz="2600"/>
+              <a:t>Diesel</a:t>
+            </a:r>
+          </a:p>
+          <a:p>
+            <a:r>
+              <a:rPr lang="en-US" sz="2600"/>
+              <a:t>Emporio Armani</a:t>
+            </a:r>
+          </a:p>
+          <a:p>
+            <a:r>
+              <a:rPr lang="en-US" sz="2600"/>
+              <a:t>Fossil</a:t>
+            </a:r>
+          </a:p>
+          <a:p>
+            <a:r>
+              <a:rPr lang="en-US" sz="2600"/>
+              <a:t>Gc</a:t>
+            </a:r>
+          </a:p>
+          <a:p>
+            <a:r>
+              <a:rPr lang="en-US" sz="2600"/>
+              <a:t>Guess</a:t>
+            </a:r>
+          </a:p>
+          <a:p>
+            <a:r>
+              <a:rPr lang="en-US" sz="2600"/>
+              <a:t>Intel</a:t>
+            </a:r>
+          </a:p>
+          <a:p>
+            <a:r>
+              <a:rPr lang="en-US" sz="2600"/>
+              <a:t>Kate Spade</a:t>
+            </a:r>
+          </a:p>
+          <a:p>
+            <a:r>
+              <a:rPr lang="en-US" sz="2600"/>
+              <a:t>LG</a:t>
+            </a:r>
+          </a:p>
+          <a:p>
+            <a:r>
+              <a:rPr lang="en-US" sz="2600"/>
+              <a:t>Louis Vitton</a:t>
+            </a:r>
+          </a:p>
+          <a:p>
+            <a:r>
+              <a:rPr lang="en-US" sz="2600"/>
+              <a:t>MediaTek</a:t>
+            </a:r>
+          </a:p>
+          <a:p>
+            <a:r>
+              <a:rPr lang="en-US" sz="2600"/>
+              <a:t>Michael Kors Access</a:t>
+            </a:r>
+          </a:p>
+          <a:p>
+            <a:r>
+              <a:rPr lang="en-US" sz="2600"/>
+              <a:t>MIPS</a:t>
+            </a:r>
+          </a:p>
+          <a:p>
+            <a:r>
+              <a:rPr lang="en-US" sz="2600"/>
+              <a:t>Misfit</a:t>
+            </a:r>
+          </a:p>
+          <a:p>
+            <a:r>
+              <a:rPr lang="en-US" sz="2600"/>
+              <a:t>Mobvoi</a:t>
+            </a:r>
+          </a:p>
+          <a:p>
+            <a:r>
+              <a:rPr lang="en-US" sz="2600"/>
+              <a:t>Mont Blanc</a:t>
+            </a:r>
+          </a:p>
+          <a:p>
+            <a:r>
+              <a:rPr lang="en-US" sz="2600"/>
+              <a:t>Motorola</a:t>
+            </a:r>
+          </a:p>
+          <a:p>
+            <a:r>
+              <a:rPr lang="en-US" sz="2600"/>
+              <a:t>Movado</a:t>
+            </a:r>
+          </a:p>
+          <a:p>
+            <a:r>
+              <a:rPr lang="en-US" sz="2600"/>
+              <a:t>New Balance</a:t>
+            </a:r>
+          </a:p>
+          <a:p>
+            <a:r>
+              <a:rPr lang="en-US" sz="2600"/>
+              <a:t>Nixon</a:t>
+            </a:r>
+          </a:p>
+          <a:p>
+            <a:r>
+              <a:rPr lang="en-US" sz="2600"/>
+              <a:t>Polar</a:t>
+            </a:r>
+          </a:p>
+          <a:p>
+            <a:r>
+              <a:rPr lang="en-US" sz="2600"/>
+              <a:t>Qualcomm</a:t>
+            </a:r>
+          </a:p>
+          <a:p>
+            <a:r>
+              <a:rPr lang="en-US" sz="2600"/>
+              <a:t>Samsung</a:t>
+            </a:r>
+          </a:p>
+          <a:p>
+            <a:r>
+              <a:rPr lang="en-US" sz="2600"/>
+              <a:t>Skagen</a:t>
+            </a:r>
+          </a:p>
+          <a:p>
+            <a:r>
+              <a:rPr lang="en-US" sz="2600"/>
+              <a:t>Sony</a:t>
+            </a:r>
+          </a:p>
+          <a:p>
+            <a:r>
+              <a:rPr lang="en-US" sz="2600"/>
+              <a:t>Tag Heuer</a:t>
+            </a:r>
+          </a:p>
+          <a:p>
+            <a:r>
+              <a:rPr lang="en-US" sz="2600"/>
+              <a:t>T Mobile</a:t>
+            </a:r>
+          </a:p>
+          <a:p>
+            <a:r>
+              <a:rPr lang="en-US" sz="2600"/>
+              <a:t>Tommy Hilfiger</a:t>
+            </a:r>
+          </a:p>
+          <a:p>
+            <a:r>
+              <a:rPr lang="en-US" sz="2600"/>
+              <a:t>Verizon</a:t>
+            </a:r>
+          </a:p>
+          <a:p>
+            <a:endParaRPr lang="en-US" sz="2600"/>
+          </a:p>
+        </p:txBody>
+      </p:sp>
+      <p:sp>
+        <p:nvSpPr>
+          <p:cNvPr id="4" name="TextBox 3">
+            <a:extLst>
+              <a:ext uri="{FF2B5EF4-FFF2-40B4-BE49-F238E27FC236}">
+                <a16:creationId xmlns:a16="http://schemas.microsoft.com/office/drawing/2014/main" id="{06B05492-5AB3-AC4A-9E66-786151A4218F}"/>
+              </a:ext>
+            </a:extLst>
+          </p:cNvPr>
+          <p:cNvSpPr txBox="1"/>
+          <p:nvPr/>
+        </p:nvSpPr>
+        <p:spPr>
+          <a:xfrm>
+            <a:off x="8269356" y="6266656"/>
+            <a:ext cx="3633559" cy="369332"/>
+          </a:xfrm>
+          <a:prstGeom prst="rect">
+            <a:avLst/>
+          </a:prstGeom>
+          <a:noFill/>
+        </p:spPr>
+        <p:txBody>
+          <a:bodyPr wrap="none" rtlCol="0">
+            <a:spAutoFit/>
+          </a:bodyPr>
+          <a:lstStyle/>
+          <a:p>
+            <a:r>
+              <a:rPr lang="en-US" dirty="0"/>
+              <a:t>https://</a:t>
+            </a:r>
+            <a:r>
+              <a:rPr lang="en-US" dirty="0" err="1"/>
+              <a:t>developer.android.com</a:t>
+            </a:r>
+            <a:r>
+              <a:rPr lang="en-US" dirty="0"/>
+              <a:t>/wear</a:t>
+            </a:r>
+          </a:p>
+        </p:txBody>
+      </p:sp>
+    </p:spTree>
+    <p:extLst>
+      <p:ext uri="{BB962C8B-B14F-4D97-AF65-F5344CB8AC3E}">
+        <p14:creationId xmlns:p14="http://schemas.microsoft.com/office/powerpoint/2010/main" val="1979933117"/>
+      </p:ext>
+    </p:extLst>
+  </p:cSld>
+  <p:clrMapOvr>
+    <a:masterClrMapping/>
+  </p:clrMapOvr>
+</p:sld>
+</file>
+
+<file path=ppt/slides/slide3.xml><?xml version="1.0" encoding="utf-8"?>
+<p:sld xmlns:a="http://schemas.openxmlformats.org/drawingml/2006/main" xmlns:r="http://schemas.openxmlformats.org/officeDocument/2006/relationships" xmlns:p="http://schemas.openxmlformats.org/presentationml/2006/main">
+  <p:cSld>
+    <p:bg>
+      <p:bgPr>
+        <a:solidFill>
+          <a:schemeClr val="bg1"/>
+        </a:solidFill>
+        <a:effectLst/>
+      </p:bgPr>
+    </p:bg>
+    <p:spTree>
+      <p:nvGrpSpPr>
+        <p:cNvPr id="1" name=""/>
+        <p:cNvGrpSpPr/>
+        <p:nvPr/>
+      </p:nvGrpSpPr>
+      <p:grpSpPr>
+        <a:xfrm>
+          <a:off x="0" y="0"/>
+          <a:ext cx="0" cy="0"/>
+          <a:chOff x="0" y="0"/>
+          <a:chExt cx="0" cy="0"/>
+        </a:xfrm>
+      </p:grpSpPr>
+      <p:sp useBgFill="1">
+        <p:nvSpPr>
           <p:cNvPr id="15" name="Rectangle 14">
             <a:extLst>
               <a:ext uri="{FF2B5EF4-FFF2-40B4-BE49-F238E27FC236}">
@@ -7338,594 +7951,6 @@
     <p:extLst>
       <p:ext uri="{BB962C8B-B14F-4D97-AF65-F5344CB8AC3E}">
         <p14:creationId xmlns:p14="http://schemas.microsoft.com/office/powerpoint/2010/main" val="715805780"/>
-      </p:ext>
-    </p:extLst>
-  </p:cSld>
-  <p:clrMapOvr>
-    <a:masterClrMapping/>
-  </p:clrMapOvr>
-</p:sld>
-</file>
-
-<file path=ppt/slides/slide3.xml><?xml version="1.0" encoding="utf-8"?>
-<p:sld xmlns:a="http://schemas.openxmlformats.org/drawingml/2006/main" xmlns:r="http://schemas.openxmlformats.org/officeDocument/2006/relationships" xmlns:p="http://schemas.openxmlformats.org/presentationml/2006/main">
-  <p:cSld>
-    <p:bg>
-      <p:bgPr>
-        <a:solidFill>
-          <a:schemeClr val="bg1"/>
-        </a:solidFill>
-        <a:effectLst/>
-      </p:bgPr>
-    </p:bg>
-    <p:spTree>
-      <p:nvGrpSpPr>
-        <p:cNvPr id="1" name=""/>
-        <p:cNvGrpSpPr/>
-        <p:nvPr/>
-      </p:nvGrpSpPr>
-      <p:grpSpPr>
-        <a:xfrm>
-          <a:off x="0" y="0"/>
-          <a:ext cx="0" cy="0"/>
-          <a:chOff x="0" y="0"/>
-          <a:chExt cx="0" cy="0"/>
-        </a:xfrm>
-      </p:grpSpPr>
-      <p:sp useBgFill="1">
-        <p:nvSpPr>
-          <p:cNvPr id="17" name="Rectangle 16">
-            <a:extLst>
-              <a:ext uri="{FF2B5EF4-FFF2-40B4-BE49-F238E27FC236}">
-                <a16:creationId xmlns:a16="http://schemas.microsoft.com/office/drawing/2014/main" id="{1BB867FF-FC45-48F7-8104-F89BE54909F1}"/>
-              </a:ext>
-              <a:ext uri="{C183D7F6-B498-43B3-948B-1728B52AA6E4}">
-                <adec:decorative xmlns:adec="http://schemas.microsoft.com/office/drawing/2017/decorative" val="1"/>
-              </a:ext>
-            </a:extLst>
-          </p:cNvPr>
-          <p:cNvSpPr>
-            <a:spLocks noGrp="1" noRot="1" noChangeAspect="1" noMove="1" noResize="1" noEditPoints="1" noAdjustHandles="1" noChangeArrowheads="1" noChangeShapeType="1" noTextEdit="1"/>
-          </p:cNvSpPr>
-          <p:nvPr>
-            <p:extLst>
-              <p:ext uri="{386F3935-93C4-4BCD-93E2-E3B085C9AB24}">
-                <p16:designElem xmlns:p16="http://schemas.microsoft.com/office/powerpoint/2015/main" val="1"/>
-              </p:ext>
-            </p:extLst>
-          </p:nvPr>
-        </p:nvSpPr>
-        <p:spPr>
-          <a:xfrm>
-            <a:off x="3048" y="0"/>
-            <a:ext cx="12188952" cy="6858000"/>
-          </a:xfrm>
-          <a:prstGeom prst="rect">
-            <a:avLst/>
-          </a:prstGeom>
-          <a:ln>
-            <a:noFill/>
-          </a:ln>
-        </p:spPr>
-        <p:style>
-          <a:lnRef idx="2">
-            <a:schemeClr val="accent1">
-              <a:shade val="50000"/>
-            </a:schemeClr>
-          </a:lnRef>
-          <a:fillRef idx="1">
-            <a:schemeClr val="accent1"/>
-          </a:fillRef>
-          <a:effectRef idx="0">
-            <a:schemeClr val="accent1"/>
-          </a:effectRef>
-          <a:fontRef idx="minor">
-            <a:schemeClr val="lt1"/>
-          </a:fontRef>
-        </p:style>
-        <p:txBody>
-          <a:bodyPr rtlCol="0" anchor="ctr"/>
-          <a:lstStyle/>
-          <a:p>
-            <a:pPr algn="ctr"/>
-            <a:endParaRPr lang="en-US"/>
-          </a:p>
-        </p:txBody>
-      </p:sp>
-      <p:sp>
-        <p:nvSpPr>
-          <p:cNvPr id="19" name="Freeform: Shape 18">
-            <a:extLst>
-              <a:ext uri="{FF2B5EF4-FFF2-40B4-BE49-F238E27FC236}">
-                <a16:creationId xmlns:a16="http://schemas.microsoft.com/office/drawing/2014/main" id="{8BB56887-D0D5-4F0C-9E19-7247EB83C8B7}"/>
-              </a:ext>
-              <a:ext uri="{C183D7F6-B498-43B3-948B-1728B52AA6E4}">
-                <adec:decorative xmlns:adec="http://schemas.microsoft.com/office/drawing/2017/decorative" val="1"/>
-              </a:ext>
-            </a:extLst>
-          </p:cNvPr>
-          <p:cNvSpPr>
-            <a:spLocks noGrp="1" noRot="1" noChangeAspect="1" noMove="1" noResize="1" noEditPoints="1" noAdjustHandles="1" noChangeArrowheads="1" noChangeShapeType="1" noTextEdit="1"/>
-          </p:cNvSpPr>
-          <p:nvPr>
-            <p:extLst>
-              <p:ext uri="{386F3935-93C4-4BCD-93E2-E3B085C9AB24}">
-                <p16:designElem xmlns:p16="http://schemas.microsoft.com/office/powerpoint/2015/main" val="1"/>
-              </p:ext>
-            </p:extLst>
-          </p:nvPr>
-        </p:nvSpPr>
-        <p:spPr>
-          <a:xfrm>
-            <a:off x="10208695" y="1"/>
-            <a:ext cx="1135066" cy="477997"/>
-          </a:xfrm>
-          <a:custGeom>
-            <a:avLst/>
-            <a:gdLst>
-              <a:gd name="connsiteX0" fmla="*/ 0 w 1135066"/>
-              <a:gd name="connsiteY0" fmla="*/ 0 h 477997"/>
-              <a:gd name="connsiteX1" fmla="*/ 1135066 w 1135066"/>
-              <a:gd name="connsiteY1" fmla="*/ 0 h 477997"/>
-              <a:gd name="connsiteX2" fmla="*/ 1133370 w 1135066"/>
-              <a:gd name="connsiteY2" fmla="*/ 16827 h 477997"/>
-              <a:gd name="connsiteX3" fmla="*/ 567533 w 1135066"/>
-              <a:gd name="connsiteY3" fmla="*/ 477997 h 477997"/>
-              <a:gd name="connsiteX4" fmla="*/ 1696 w 1135066"/>
-              <a:gd name="connsiteY4" fmla="*/ 16827 h 477997"/>
-            </a:gdLst>
-            <a:ahLst/>
-            <a:cxnLst>
-              <a:cxn ang="0">
-                <a:pos x="connsiteX0" y="connsiteY0"/>
-              </a:cxn>
-              <a:cxn ang="0">
-                <a:pos x="connsiteX1" y="connsiteY1"/>
-              </a:cxn>
-              <a:cxn ang="0">
-                <a:pos x="connsiteX2" y="connsiteY2"/>
-              </a:cxn>
-              <a:cxn ang="0">
-                <a:pos x="connsiteX3" y="connsiteY3"/>
-              </a:cxn>
-              <a:cxn ang="0">
-                <a:pos x="connsiteX4" y="connsiteY4"/>
-              </a:cxn>
-            </a:cxnLst>
-            <a:rect l="l" t="t" r="r" b="b"/>
-            <a:pathLst>
-              <a:path w="1135066" h="477997">
-                <a:moveTo>
-                  <a:pt x="0" y="0"/>
-                </a:moveTo>
-                <a:lnTo>
-                  <a:pt x="1135066" y="0"/>
-                </a:lnTo>
-                <a:lnTo>
-                  <a:pt x="1133370" y="16827"/>
-                </a:lnTo>
-                <a:cubicBezTo>
-                  <a:pt x="1079514" y="280016"/>
-                  <a:pt x="846644" y="477997"/>
-                  <a:pt x="567533" y="477997"/>
-                </a:cubicBezTo>
-                <a:cubicBezTo>
-                  <a:pt x="288422" y="477997"/>
-                  <a:pt x="55552" y="280016"/>
-                  <a:pt x="1696" y="16827"/>
-                </a:cubicBezTo>
-                <a:close/>
-              </a:path>
-            </a:pathLst>
-          </a:custGeom>
-          <a:solidFill>
-            <a:schemeClr val="accent4"/>
-          </a:solidFill>
-          <a:ln>
-            <a:noFill/>
-          </a:ln>
-        </p:spPr>
-        <p:style>
-          <a:lnRef idx="2">
-            <a:schemeClr val="accent1">
-              <a:shade val="50000"/>
-            </a:schemeClr>
-          </a:lnRef>
-          <a:fillRef idx="1">
-            <a:schemeClr val="accent1"/>
-          </a:fillRef>
-          <a:effectRef idx="0">
-            <a:schemeClr val="accent1"/>
-          </a:effectRef>
-          <a:fontRef idx="minor">
-            <a:schemeClr val="lt1"/>
-          </a:fontRef>
-        </p:style>
-        <p:txBody>
-          <a:bodyPr wrap="square" rtlCol="0" anchor="ctr">
-            <a:noAutofit/>
-          </a:bodyPr>
-          <a:lstStyle/>
-          <a:p>
-            <a:pPr algn="ctr"/>
-            <a:endParaRPr lang="en-US"/>
-          </a:p>
-        </p:txBody>
-      </p:sp>
-      <p:sp>
-        <p:nvSpPr>
-          <p:cNvPr id="2" name="Title 1">
-            <a:extLst>
-              <a:ext uri="{FF2B5EF4-FFF2-40B4-BE49-F238E27FC236}">
-                <a16:creationId xmlns:a16="http://schemas.microsoft.com/office/drawing/2014/main" id="{9BD83972-5B67-0F43-8D1A-E3D96906CCDF}"/>
-              </a:ext>
-            </a:extLst>
-          </p:cNvPr>
-          <p:cNvSpPr>
-            <a:spLocks noGrp="1"/>
-          </p:cNvSpPr>
-          <p:nvPr>
-            <p:ph type="title"/>
-          </p:nvPr>
-        </p:nvSpPr>
-        <p:spPr>
-          <a:xfrm>
-            <a:off x="838200" y="365125"/>
-            <a:ext cx="10515600" cy="1325563"/>
-          </a:xfrm>
-        </p:spPr>
-        <p:txBody>
-          <a:bodyPr>
-            <a:normAutofit/>
-          </a:bodyPr>
-          <a:lstStyle/>
-          <a:p>
-            <a:r>
-              <a:rPr lang="en-US"/>
-              <a:t>WearOS Partners</a:t>
-            </a:r>
-            <a:endParaRPr lang="en-US" dirty="0"/>
-          </a:p>
-        </p:txBody>
-      </p:sp>
-      <p:sp>
-        <p:nvSpPr>
-          <p:cNvPr id="21" name="Arc 20">
-            <a:extLst>
-              <a:ext uri="{FF2B5EF4-FFF2-40B4-BE49-F238E27FC236}">
-                <a16:creationId xmlns:a16="http://schemas.microsoft.com/office/drawing/2014/main" id="{081E4A58-353D-44AE-B2FC-2A74E2E400F7}"/>
-              </a:ext>
-              <a:ext uri="{C183D7F6-B498-43B3-948B-1728B52AA6E4}">
-                <adec:decorative xmlns:adec="http://schemas.microsoft.com/office/drawing/2017/decorative" val="1"/>
-              </a:ext>
-            </a:extLst>
-          </p:cNvPr>
-          <p:cNvSpPr>
-            <a:spLocks noGrp="1" noRot="1" noChangeAspect="1" noMove="1" noResize="1" noEditPoints="1" noAdjustHandles="1" noChangeArrowheads="1" noChangeShapeType="1" noTextEdit="1"/>
-          </p:cNvSpPr>
-          <p:nvPr>
-            <p:extLst>
-              <p:ext uri="{386F3935-93C4-4BCD-93E2-E3B085C9AB24}">
-                <p16:designElem xmlns:p16="http://schemas.microsoft.com/office/powerpoint/2015/main" val="1"/>
-              </p:ext>
-            </p:extLst>
-          </p:nvPr>
-        </p:nvSpPr>
-        <p:spPr>
-          <a:xfrm rot="5400000" flipV="1">
-            <a:off x="555710" y="2183223"/>
-            <a:ext cx="4083433" cy="4083433"/>
-          </a:xfrm>
-          <a:prstGeom prst="arc">
-            <a:avLst/>
-          </a:prstGeom>
-          <a:ln w="127000" cap="rnd">
-            <a:solidFill>
-              <a:schemeClr val="accent4"/>
-            </a:solidFill>
-            <a:prstDash val="dash"/>
-          </a:ln>
-        </p:spPr>
-        <p:style>
-          <a:lnRef idx="1">
-            <a:schemeClr val="accent1"/>
-          </a:lnRef>
-          <a:fillRef idx="0">
-            <a:schemeClr val="accent1"/>
-          </a:fillRef>
-          <a:effectRef idx="0">
-            <a:schemeClr val="accent1"/>
-          </a:effectRef>
-          <a:fontRef idx="minor">
-            <a:schemeClr val="tx1"/>
-          </a:fontRef>
-        </p:style>
-        <p:txBody>
-          <a:bodyPr rtlCol="0" anchor="ctr"/>
-          <a:lstStyle/>
-          <a:p>
-            <a:pPr algn="ctr"/>
-            <a:endParaRPr lang="en-US" dirty="0"/>
-          </a:p>
-        </p:txBody>
-      </p:sp>
-      <p:sp>
-        <p:nvSpPr>
-          <p:cNvPr id="3" name="Content Placeholder 2">
-            <a:extLst>
-              <a:ext uri="{FF2B5EF4-FFF2-40B4-BE49-F238E27FC236}">
-                <a16:creationId xmlns:a16="http://schemas.microsoft.com/office/drawing/2014/main" id="{61828AC4-2326-7546-9EF4-3DC409E0CBC8}"/>
-              </a:ext>
-            </a:extLst>
-          </p:cNvPr>
-          <p:cNvSpPr>
-            <a:spLocks noGrp="1"/>
-          </p:cNvSpPr>
-          <p:nvPr>
-            <p:ph idx="1"/>
-          </p:nvPr>
-        </p:nvSpPr>
-        <p:spPr>
-          <a:xfrm>
-            <a:off x="838200" y="1825625"/>
-            <a:ext cx="10515600" cy="4351338"/>
-          </a:xfrm>
-        </p:spPr>
-        <p:txBody>
-          <a:bodyPr numCol="4">
-            <a:normAutofit/>
-          </a:bodyPr>
-          <a:lstStyle/>
-          <a:p>
-            <a:r>
-              <a:rPr lang="en-US" sz="2600"/>
-              <a:t>ARM</a:t>
-            </a:r>
-          </a:p>
-          <a:p>
-            <a:r>
-              <a:rPr lang="en-US" sz="2600"/>
-              <a:t>Asus</a:t>
-            </a:r>
-          </a:p>
-          <a:p>
-            <a:r>
-              <a:rPr lang="en-US" sz="2600"/>
-              <a:t>Hugo Boss</a:t>
-            </a:r>
-          </a:p>
-          <a:p>
-            <a:r>
-              <a:rPr lang="en-US" sz="2600"/>
-              <a:t>Broadcom</a:t>
-            </a:r>
-          </a:p>
-          <a:p>
-            <a:r>
-              <a:rPr lang="en-US" sz="2600"/>
-              <a:t>Casio</a:t>
-            </a:r>
-          </a:p>
-          <a:p>
-            <a:r>
-              <a:rPr lang="en-US" sz="2600"/>
-              <a:t>Diesel</a:t>
-            </a:r>
-          </a:p>
-          <a:p>
-            <a:r>
-              <a:rPr lang="en-US" sz="2600"/>
-              <a:t>Emporio Armani</a:t>
-            </a:r>
-          </a:p>
-          <a:p>
-            <a:r>
-              <a:rPr lang="en-US" sz="2600"/>
-              <a:t>Fossil</a:t>
-            </a:r>
-          </a:p>
-          <a:p>
-            <a:r>
-              <a:rPr lang="en-US" sz="2600"/>
-              <a:t>Gc</a:t>
-            </a:r>
-          </a:p>
-          <a:p>
-            <a:r>
-              <a:rPr lang="en-US" sz="2600"/>
-              <a:t>Guess</a:t>
-            </a:r>
-          </a:p>
-          <a:p>
-            <a:r>
-              <a:rPr lang="en-US" sz="2600"/>
-              <a:t>Intel</a:t>
-            </a:r>
-          </a:p>
-          <a:p>
-            <a:r>
-              <a:rPr lang="en-US" sz="2600"/>
-              <a:t>Kate Spade</a:t>
-            </a:r>
-          </a:p>
-          <a:p>
-            <a:r>
-              <a:rPr lang="en-US" sz="2600"/>
-              <a:t>LG</a:t>
-            </a:r>
-          </a:p>
-          <a:p>
-            <a:r>
-              <a:rPr lang="en-US" sz="2600"/>
-              <a:t>Louis Vitton</a:t>
-            </a:r>
-          </a:p>
-          <a:p>
-            <a:r>
-              <a:rPr lang="en-US" sz="2600"/>
-              <a:t>MediaTek</a:t>
-            </a:r>
-          </a:p>
-          <a:p>
-            <a:r>
-              <a:rPr lang="en-US" sz="2600"/>
-              <a:t>Michael Kors Access</a:t>
-            </a:r>
-          </a:p>
-          <a:p>
-            <a:r>
-              <a:rPr lang="en-US" sz="2600"/>
-              <a:t>MIPS</a:t>
-            </a:r>
-          </a:p>
-          <a:p>
-            <a:r>
-              <a:rPr lang="en-US" sz="2600"/>
-              <a:t>Misfit</a:t>
-            </a:r>
-          </a:p>
-          <a:p>
-            <a:r>
-              <a:rPr lang="en-US" sz="2600"/>
-              <a:t>Mobvoi</a:t>
-            </a:r>
-          </a:p>
-          <a:p>
-            <a:r>
-              <a:rPr lang="en-US" sz="2600"/>
-              <a:t>Mont Blanc</a:t>
-            </a:r>
-          </a:p>
-          <a:p>
-            <a:r>
-              <a:rPr lang="en-US" sz="2600"/>
-              <a:t>Motorola</a:t>
-            </a:r>
-          </a:p>
-          <a:p>
-            <a:r>
-              <a:rPr lang="en-US" sz="2600"/>
-              <a:t>Movado</a:t>
-            </a:r>
-          </a:p>
-          <a:p>
-            <a:r>
-              <a:rPr lang="en-US" sz="2600"/>
-              <a:t>New Balance</a:t>
-            </a:r>
-          </a:p>
-          <a:p>
-            <a:r>
-              <a:rPr lang="en-US" sz="2600"/>
-              <a:t>Nixon</a:t>
-            </a:r>
-          </a:p>
-          <a:p>
-            <a:r>
-              <a:rPr lang="en-US" sz="2600"/>
-              <a:t>Polar</a:t>
-            </a:r>
-          </a:p>
-          <a:p>
-            <a:r>
-              <a:rPr lang="en-US" sz="2600"/>
-              <a:t>Qualcomm</a:t>
-            </a:r>
-          </a:p>
-          <a:p>
-            <a:r>
-              <a:rPr lang="en-US" sz="2600"/>
-              <a:t>Samsung</a:t>
-            </a:r>
-          </a:p>
-          <a:p>
-            <a:r>
-              <a:rPr lang="en-US" sz="2600"/>
-              <a:t>Skagen</a:t>
-            </a:r>
-          </a:p>
-          <a:p>
-            <a:r>
-              <a:rPr lang="en-US" sz="2600"/>
-              <a:t>Sony</a:t>
-            </a:r>
-          </a:p>
-          <a:p>
-            <a:r>
-              <a:rPr lang="en-US" sz="2600"/>
-              <a:t>Tag Heuer</a:t>
-            </a:r>
-          </a:p>
-          <a:p>
-            <a:r>
-              <a:rPr lang="en-US" sz="2600"/>
-              <a:t>T Mobile</a:t>
-            </a:r>
-          </a:p>
-          <a:p>
-            <a:r>
-              <a:rPr lang="en-US" sz="2600"/>
-              <a:t>Tommy Hilfiger</a:t>
-            </a:r>
-          </a:p>
-          <a:p>
-            <a:r>
-              <a:rPr lang="en-US" sz="2600"/>
-              <a:t>Verizon</a:t>
-            </a:r>
-          </a:p>
-          <a:p>
-            <a:endParaRPr lang="en-US" sz="2600"/>
-          </a:p>
-        </p:txBody>
-      </p:sp>
-      <p:sp>
-        <p:nvSpPr>
-          <p:cNvPr id="4" name="TextBox 3">
-            <a:extLst>
-              <a:ext uri="{FF2B5EF4-FFF2-40B4-BE49-F238E27FC236}">
-                <a16:creationId xmlns:a16="http://schemas.microsoft.com/office/drawing/2014/main" id="{06B05492-5AB3-AC4A-9E66-786151A4218F}"/>
-              </a:ext>
-            </a:extLst>
-          </p:cNvPr>
-          <p:cNvSpPr txBox="1"/>
-          <p:nvPr/>
-        </p:nvSpPr>
-        <p:spPr>
-          <a:xfrm>
-            <a:off x="8269356" y="6266656"/>
-            <a:ext cx="3633559" cy="369332"/>
-          </a:xfrm>
-          <a:prstGeom prst="rect">
-            <a:avLst/>
-          </a:prstGeom>
-          <a:noFill/>
-        </p:spPr>
-        <p:txBody>
-          <a:bodyPr wrap="none" rtlCol="0">
-            <a:spAutoFit/>
-          </a:bodyPr>
-          <a:lstStyle/>
-          <a:p>
-            <a:r>
-              <a:rPr lang="en-US" dirty="0"/>
-              <a:t>https://</a:t>
-            </a:r>
-            <a:r>
-              <a:rPr lang="en-US" dirty="0" err="1"/>
-              <a:t>developer.android.com</a:t>
-            </a:r>
-            <a:r>
-              <a:rPr lang="en-US" dirty="0"/>
-              <a:t>/wear</a:t>
-            </a:r>
-          </a:p>
-        </p:txBody>
-      </p:sp>
-    </p:spTree>
-    <p:extLst>
-      <p:ext uri="{BB962C8B-B14F-4D97-AF65-F5344CB8AC3E}">
-        <p14:creationId xmlns:p14="http://schemas.microsoft.com/office/powerpoint/2010/main" val="1979933117"/>
       </p:ext>
     </p:extLst>
   </p:cSld>

</xml_diff>